<commit_message>
RTF 4 D  - Atualizar foto do Proto-persona (Gabriel)
</commit_message>
<xml_diff>
--- a/documentação/Proto-Persona/ProtoPersona.pptx
+++ b/documentação/Proto-Persona/ProtoPersona.pptx
@@ -136,7 +136,7 @@
           <p:cNvPr id="2" name="Título 1">
             <a:extLst>
               <a:ext uri="{FF2B5EF4-FFF2-40B4-BE49-F238E27FC236}">
-                <a16:creationId xmlns:a16="http://schemas.microsoft.com/office/drawing/2014/main" xmlns="" id="{C42376DB-67E5-4FC2-A8B8-19087539436E}"/>
+                <a16:creationId xmlns="" xmlns:a16="http://schemas.microsoft.com/office/drawing/2014/main" id="{C42376DB-67E5-4FC2-A8B8-19087539436E}"/>
               </a:ext>
             </a:extLst>
           </p:cNvPr>
@@ -173,7 +173,7 @@
           <p:cNvPr id="3" name="Subtítulo 2">
             <a:extLst>
               <a:ext uri="{FF2B5EF4-FFF2-40B4-BE49-F238E27FC236}">
-                <a16:creationId xmlns:a16="http://schemas.microsoft.com/office/drawing/2014/main" xmlns="" id="{C9BFB20A-69A8-4114-86AF-5C82CB25FF1E}"/>
+                <a16:creationId xmlns="" xmlns:a16="http://schemas.microsoft.com/office/drawing/2014/main" id="{C9BFB20A-69A8-4114-86AF-5C82CB25FF1E}"/>
               </a:ext>
             </a:extLst>
           </p:cNvPr>
@@ -243,7 +243,7 @@
           <p:cNvPr id="4" name="Espaço Reservado para Data 3">
             <a:extLst>
               <a:ext uri="{FF2B5EF4-FFF2-40B4-BE49-F238E27FC236}">
-                <a16:creationId xmlns:a16="http://schemas.microsoft.com/office/drawing/2014/main" xmlns="" id="{9537530C-0A7F-4697-97A9-216640B5B806}"/>
+                <a16:creationId xmlns="" xmlns:a16="http://schemas.microsoft.com/office/drawing/2014/main" id="{9537530C-0A7F-4697-97A9-216640B5B806}"/>
               </a:ext>
             </a:extLst>
           </p:cNvPr>
@@ -261,7 +261,7 @@
           <a:p>
             <a:fld id="{9783B411-DC8B-4A5C-A959-3C440392E8CA}" type="datetimeFigureOut">
               <a:rPr lang="pt-BR" smtClean="0"/>
-              <a:t>07/09/2020</a:t>
+              <a:t>17/09/2020</a:t>
             </a:fld>
             <a:endParaRPr lang="pt-BR"/>
           </a:p>
@@ -272,7 +272,7 @@
           <p:cNvPr id="5" name="Espaço Reservado para Rodapé 4">
             <a:extLst>
               <a:ext uri="{FF2B5EF4-FFF2-40B4-BE49-F238E27FC236}">
-                <a16:creationId xmlns:a16="http://schemas.microsoft.com/office/drawing/2014/main" xmlns="" id="{EB0EE9B1-F484-40B0-BAE7-05492126CEF3}"/>
+                <a16:creationId xmlns="" xmlns:a16="http://schemas.microsoft.com/office/drawing/2014/main" id="{EB0EE9B1-F484-40B0-BAE7-05492126CEF3}"/>
               </a:ext>
             </a:extLst>
           </p:cNvPr>
@@ -297,7 +297,7 @@
           <p:cNvPr id="6" name="Espaço Reservado para Número de Slide 5">
             <a:extLst>
               <a:ext uri="{FF2B5EF4-FFF2-40B4-BE49-F238E27FC236}">
-                <a16:creationId xmlns:a16="http://schemas.microsoft.com/office/drawing/2014/main" xmlns="" id="{2B9208D6-D3A7-427E-847E-5D512F9D1A75}"/>
+                <a16:creationId xmlns="" xmlns:a16="http://schemas.microsoft.com/office/drawing/2014/main" id="{2B9208D6-D3A7-427E-847E-5D512F9D1A75}"/>
               </a:ext>
             </a:extLst>
           </p:cNvPr>
@@ -356,7 +356,7 @@
           <p:cNvPr id="2" name="Título 1">
             <a:extLst>
               <a:ext uri="{FF2B5EF4-FFF2-40B4-BE49-F238E27FC236}">
-                <a16:creationId xmlns:a16="http://schemas.microsoft.com/office/drawing/2014/main" xmlns="" id="{25CBB5D8-284C-406A-8303-E7EE653679C4}"/>
+                <a16:creationId xmlns="" xmlns:a16="http://schemas.microsoft.com/office/drawing/2014/main" id="{25CBB5D8-284C-406A-8303-E7EE653679C4}"/>
               </a:ext>
             </a:extLst>
           </p:cNvPr>
@@ -384,7 +384,7 @@
           <p:cNvPr id="3" name="Espaço Reservado para Texto Vertical 2">
             <a:extLst>
               <a:ext uri="{FF2B5EF4-FFF2-40B4-BE49-F238E27FC236}">
-                <a16:creationId xmlns:a16="http://schemas.microsoft.com/office/drawing/2014/main" xmlns="" id="{3F6AE706-009A-4038-A7C2-9F9EA54FD317}"/>
+                <a16:creationId xmlns="" xmlns:a16="http://schemas.microsoft.com/office/drawing/2014/main" id="{3F6AE706-009A-4038-A7C2-9F9EA54FD317}"/>
               </a:ext>
             </a:extLst>
           </p:cNvPr>
@@ -441,7 +441,7 @@
           <p:cNvPr id="4" name="Espaço Reservado para Data 3">
             <a:extLst>
               <a:ext uri="{FF2B5EF4-FFF2-40B4-BE49-F238E27FC236}">
-                <a16:creationId xmlns:a16="http://schemas.microsoft.com/office/drawing/2014/main" xmlns="" id="{2BFC5CDD-361F-4A05-9D8C-D610963CBB67}"/>
+                <a16:creationId xmlns="" xmlns:a16="http://schemas.microsoft.com/office/drawing/2014/main" id="{2BFC5CDD-361F-4A05-9D8C-D610963CBB67}"/>
               </a:ext>
             </a:extLst>
           </p:cNvPr>
@@ -459,7 +459,7 @@
           <a:p>
             <a:fld id="{9783B411-DC8B-4A5C-A959-3C440392E8CA}" type="datetimeFigureOut">
               <a:rPr lang="pt-BR" smtClean="0"/>
-              <a:t>07/09/2020</a:t>
+              <a:t>17/09/2020</a:t>
             </a:fld>
             <a:endParaRPr lang="pt-BR"/>
           </a:p>
@@ -470,7 +470,7 @@
           <p:cNvPr id="5" name="Espaço Reservado para Rodapé 4">
             <a:extLst>
               <a:ext uri="{FF2B5EF4-FFF2-40B4-BE49-F238E27FC236}">
-                <a16:creationId xmlns:a16="http://schemas.microsoft.com/office/drawing/2014/main" xmlns="" id="{3AC3F35C-43DF-4777-A33A-F5E08C8C1A3E}"/>
+                <a16:creationId xmlns="" xmlns:a16="http://schemas.microsoft.com/office/drawing/2014/main" id="{3AC3F35C-43DF-4777-A33A-F5E08C8C1A3E}"/>
               </a:ext>
             </a:extLst>
           </p:cNvPr>
@@ -495,7 +495,7 @@
           <p:cNvPr id="6" name="Espaço Reservado para Número de Slide 5">
             <a:extLst>
               <a:ext uri="{FF2B5EF4-FFF2-40B4-BE49-F238E27FC236}">
-                <a16:creationId xmlns:a16="http://schemas.microsoft.com/office/drawing/2014/main" xmlns="" id="{2686F728-D817-43F5-84BB-B0D0A842DB33}"/>
+                <a16:creationId xmlns="" xmlns:a16="http://schemas.microsoft.com/office/drawing/2014/main" id="{2686F728-D817-43F5-84BB-B0D0A842DB33}"/>
               </a:ext>
             </a:extLst>
           </p:cNvPr>
@@ -554,7 +554,7 @@
           <p:cNvPr id="2" name="Título Vertical 1">
             <a:extLst>
               <a:ext uri="{FF2B5EF4-FFF2-40B4-BE49-F238E27FC236}">
-                <a16:creationId xmlns:a16="http://schemas.microsoft.com/office/drawing/2014/main" xmlns="" id="{F38F304B-5B7E-4DB0-A2E0-7725F0A40555}"/>
+                <a16:creationId xmlns="" xmlns:a16="http://schemas.microsoft.com/office/drawing/2014/main" id="{F38F304B-5B7E-4DB0-A2E0-7725F0A40555}"/>
               </a:ext>
             </a:extLst>
           </p:cNvPr>
@@ -587,7 +587,7 @@
           <p:cNvPr id="3" name="Espaço Reservado para Texto Vertical 2">
             <a:extLst>
               <a:ext uri="{FF2B5EF4-FFF2-40B4-BE49-F238E27FC236}">
-                <a16:creationId xmlns:a16="http://schemas.microsoft.com/office/drawing/2014/main" xmlns="" id="{E0450032-7BDC-4A01-ACB7-7BC6B13DF250}"/>
+                <a16:creationId xmlns="" xmlns:a16="http://schemas.microsoft.com/office/drawing/2014/main" id="{E0450032-7BDC-4A01-ACB7-7BC6B13DF250}"/>
               </a:ext>
             </a:extLst>
           </p:cNvPr>
@@ -649,7 +649,7 @@
           <p:cNvPr id="4" name="Espaço Reservado para Data 3">
             <a:extLst>
               <a:ext uri="{FF2B5EF4-FFF2-40B4-BE49-F238E27FC236}">
-                <a16:creationId xmlns:a16="http://schemas.microsoft.com/office/drawing/2014/main" xmlns="" id="{C042A331-976D-49A9-99A9-A56D76BD70DE}"/>
+                <a16:creationId xmlns="" xmlns:a16="http://schemas.microsoft.com/office/drawing/2014/main" id="{C042A331-976D-49A9-99A9-A56D76BD70DE}"/>
               </a:ext>
             </a:extLst>
           </p:cNvPr>
@@ -667,7 +667,7 @@
           <a:p>
             <a:fld id="{9783B411-DC8B-4A5C-A959-3C440392E8CA}" type="datetimeFigureOut">
               <a:rPr lang="pt-BR" smtClean="0"/>
-              <a:t>07/09/2020</a:t>
+              <a:t>17/09/2020</a:t>
             </a:fld>
             <a:endParaRPr lang="pt-BR"/>
           </a:p>
@@ -678,7 +678,7 @@
           <p:cNvPr id="5" name="Espaço Reservado para Rodapé 4">
             <a:extLst>
               <a:ext uri="{FF2B5EF4-FFF2-40B4-BE49-F238E27FC236}">
-                <a16:creationId xmlns:a16="http://schemas.microsoft.com/office/drawing/2014/main" xmlns="" id="{9D67C74A-46FD-4B9F-BD7C-1DBBF5EA204F}"/>
+                <a16:creationId xmlns="" xmlns:a16="http://schemas.microsoft.com/office/drawing/2014/main" id="{9D67C74A-46FD-4B9F-BD7C-1DBBF5EA204F}"/>
               </a:ext>
             </a:extLst>
           </p:cNvPr>
@@ -703,7 +703,7 @@
           <p:cNvPr id="6" name="Espaço Reservado para Número de Slide 5">
             <a:extLst>
               <a:ext uri="{FF2B5EF4-FFF2-40B4-BE49-F238E27FC236}">
-                <a16:creationId xmlns:a16="http://schemas.microsoft.com/office/drawing/2014/main" xmlns="" id="{BAC41346-22EF-44F7-BDBC-AFC21ABADCF9}"/>
+                <a16:creationId xmlns="" xmlns:a16="http://schemas.microsoft.com/office/drawing/2014/main" id="{BAC41346-22EF-44F7-BDBC-AFC21ABADCF9}"/>
               </a:ext>
             </a:extLst>
           </p:cNvPr>
@@ -762,7 +762,7 @@
           <p:cNvPr id="2" name="Título 1">
             <a:extLst>
               <a:ext uri="{FF2B5EF4-FFF2-40B4-BE49-F238E27FC236}">
-                <a16:creationId xmlns:a16="http://schemas.microsoft.com/office/drawing/2014/main" xmlns="" id="{4A7B497A-BE3A-427D-92EC-75B8CC4E175C}"/>
+                <a16:creationId xmlns="" xmlns:a16="http://schemas.microsoft.com/office/drawing/2014/main" id="{4A7B497A-BE3A-427D-92EC-75B8CC4E175C}"/>
               </a:ext>
             </a:extLst>
           </p:cNvPr>
@@ -790,7 +790,7 @@
           <p:cNvPr id="3" name="Espaço Reservado para Conteúdo 2">
             <a:extLst>
               <a:ext uri="{FF2B5EF4-FFF2-40B4-BE49-F238E27FC236}">
-                <a16:creationId xmlns:a16="http://schemas.microsoft.com/office/drawing/2014/main" xmlns="" id="{E7368DD5-186C-4905-8F42-FBB2FACF5EDB}"/>
+                <a16:creationId xmlns="" xmlns:a16="http://schemas.microsoft.com/office/drawing/2014/main" id="{E7368DD5-186C-4905-8F42-FBB2FACF5EDB}"/>
               </a:ext>
             </a:extLst>
           </p:cNvPr>
@@ -847,7 +847,7 @@
           <p:cNvPr id="4" name="Espaço Reservado para Data 3">
             <a:extLst>
               <a:ext uri="{FF2B5EF4-FFF2-40B4-BE49-F238E27FC236}">
-                <a16:creationId xmlns:a16="http://schemas.microsoft.com/office/drawing/2014/main" xmlns="" id="{B8E4CB06-499B-4DDC-A23A-A266812F2C72}"/>
+                <a16:creationId xmlns="" xmlns:a16="http://schemas.microsoft.com/office/drawing/2014/main" id="{B8E4CB06-499B-4DDC-A23A-A266812F2C72}"/>
               </a:ext>
             </a:extLst>
           </p:cNvPr>
@@ -865,7 +865,7 @@
           <a:p>
             <a:fld id="{9783B411-DC8B-4A5C-A959-3C440392E8CA}" type="datetimeFigureOut">
               <a:rPr lang="pt-BR" smtClean="0"/>
-              <a:t>07/09/2020</a:t>
+              <a:t>17/09/2020</a:t>
             </a:fld>
             <a:endParaRPr lang="pt-BR"/>
           </a:p>
@@ -876,7 +876,7 @@
           <p:cNvPr id="5" name="Espaço Reservado para Rodapé 4">
             <a:extLst>
               <a:ext uri="{FF2B5EF4-FFF2-40B4-BE49-F238E27FC236}">
-                <a16:creationId xmlns:a16="http://schemas.microsoft.com/office/drawing/2014/main" xmlns="" id="{3D8AF31F-EA28-4FEA-97E2-F98BB0B3C706}"/>
+                <a16:creationId xmlns="" xmlns:a16="http://schemas.microsoft.com/office/drawing/2014/main" id="{3D8AF31F-EA28-4FEA-97E2-F98BB0B3C706}"/>
               </a:ext>
             </a:extLst>
           </p:cNvPr>
@@ -901,7 +901,7 @@
           <p:cNvPr id="6" name="Espaço Reservado para Número de Slide 5">
             <a:extLst>
               <a:ext uri="{FF2B5EF4-FFF2-40B4-BE49-F238E27FC236}">
-                <a16:creationId xmlns:a16="http://schemas.microsoft.com/office/drawing/2014/main" xmlns="" id="{5D817042-4C47-4834-84D5-09AACAE93018}"/>
+                <a16:creationId xmlns="" xmlns:a16="http://schemas.microsoft.com/office/drawing/2014/main" id="{5D817042-4C47-4834-84D5-09AACAE93018}"/>
               </a:ext>
             </a:extLst>
           </p:cNvPr>
@@ -960,7 +960,7 @@
           <p:cNvPr id="2" name="Título 1">
             <a:extLst>
               <a:ext uri="{FF2B5EF4-FFF2-40B4-BE49-F238E27FC236}">
-                <a16:creationId xmlns:a16="http://schemas.microsoft.com/office/drawing/2014/main" xmlns="" id="{B1364CF8-392A-44CD-8508-1E02A1947593}"/>
+                <a16:creationId xmlns="" xmlns:a16="http://schemas.microsoft.com/office/drawing/2014/main" id="{B1364CF8-392A-44CD-8508-1E02A1947593}"/>
               </a:ext>
             </a:extLst>
           </p:cNvPr>
@@ -997,7 +997,7 @@
           <p:cNvPr id="3" name="Espaço Reservado para Texto 2">
             <a:extLst>
               <a:ext uri="{FF2B5EF4-FFF2-40B4-BE49-F238E27FC236}">
-                <a16:creationId xmlns:a16="http://schemas.microsoft.com/office/drawing/2014/main" xmlns="" id="{47F9E38C-88EF-4131-9465-3901F0E416FA}"/>
+                <a16:creationId xmlns="" xmlns:a16="http://schemas.microsoft.com/office/drawing/2014/main" id="{47F9E38C-88EF-4131-9465-3901F0E416FA}"/>
               </a:ext>
             </a:extLst>
           </p:cNvPr>
@@ -1122,7 +1122,7 @@
           <p:cNvPr id="4" name="Espaço Reservado para Data 3">
             <a:extLst>
               <a:ext uri="{FF2B5EF4-FFF2-40B4-BE49-F238E27FC236}">
-                <a16:creationId xmlns:a16="http://schemas.microsoft.com/office/drawing/2014/main" xmlns="" id="{9B57A2E2-D508-4CAB-9206-CA44F3C257D2}"/>
+                <a16:creationId xmlns="" xmlns:a16="http://schemas.microsoft.com/office/drawing/2014/main" id="{9B57A2E2-D508-4CAB-9206-CA44F3C257D2}"/>
               </a:ext>
             </a:extLst>
           </p:cNvPr>
@@ -1140,7 +1140,7 @@
           <a:p>
             <a:fld id="{9783B411-DC8B-4A5C-A959-3C440392E8CA}" type="datetimeFigureOut">
               <a:rPr lang="pt-BR" smtClean="0"/>
-              <a:t>07/09/2020</a:t>
+              <a:t>17/09/2020</a:t>
             </a:fld>
             <a:endParaRPr lang="pt-BR"/>
           </a:p>
@@ -1151,7 +1151,7 @@
           <p:cNvPr id="5" name="Espaço Reservado para Rodapé 4">
             <a:extLst>
               <a:ext uri="{FF2B5EF4-FFF2-40B4-BE49-F238E27FC236}">
-                <a16:creationId xmlns:a16="http://schemas.microsoft.com/office/drawing/2014/main" xmlns="" id="{99A90B57-3B28-4BE8-B343-648871F06ACA}"/>
+                <a16:creationId xmlns="" xmlns:a16="http://schemas.microsoft.com/office/drawing/2014/main" id="{99A90B57-3B28-4BE8-B343-648871F06ACA}"/>
               </a:ext>
             </a:extLst>
           </p:cNvPr>
@@ -1176,7 +1176,7 @@
           <p:cNvPr id="6" name="Espaço Reservado para Número de Slide 5">
             <a:extLst>
               <a:ext uri="{FF2B5EF4-FFF2-40B4-BE49-F238E27FC236}">
-                <a16:creationId xmlns:a16="http://schemas.microsoft.com/office/drawing/2014/main" xmlns="" id="{488D9159-134E-4FFA-9036-E212BDD8653E}"/>
+                <a16:creationId xmlns="" xmlns:a16="http://schemas.microsoft.com/office/drawing/2014/main" id="{488D9159-134E-4FFA-9036-E212BDD8653E}"/>
               </a:ext>
             </a:extLst>
           </p:cNvPr>
@@ -1235,7 +1235,7 @@
           <p:cNvPr id="2" name="Título 1">
             <a:extLst>
               <a:ext uri="{FF2B5EF4-FFF2-40B4-BE49-F238E27FC236}">
-                <a16:creationId xmlns:a16="http://schemas.microsoft.com/office/drawing/2014/main" xmlns="" id="{75A37055-5A51-4030-A7A8-E3D5D1DCD883}"/>
+                <a16:creationId xmlns="" xmlns:a16="http://schemas.microsoft.com/office/drawing/2014/main" id="{75A37055-5A51-4030-A7A8-E3D5D1DCD883}"/>
               </a:ext>
             </a:extLst>
           </p:cNvPr>
@@ -1263,7 +1263,7 @@
           <p:cNvPr id="3" name="Espaço Reservado para Conteúdo 2">
             <a:extLst>
               <a:ext uri="{FF2B5EF4-FFF2-40B4-BE49-F238E27FC236}">
-                <a16:creationId xmlns:a16="http://schemas.microsoft.com/office/drawing/2014/main" xmlns="" id="{2705F31D-7A2C-4D45-8CB2-A71306F7131E}"/>
+                <a16:creationId xmlns="" xmlns:a16="http://schemas.microsoft.com/office/drawing/2014/main" id="{2705F31D-7A2C-4D45-8CB2-A71306F7131E}"/>
               </a:ext>
             </a:extLst>
           </p:cNvPr>
@@ -1325,7 +1325,7 @@
           <p:cNvPr id="4" name="Espaço Reservado para Conteúdo 3">
             <a:extLst>
               <a:ext uri="{FF2B5EF4-FFF2-40B4-BE49-F238E27FC236}">
-                <a16:creationId xmlns:a16="http://schemas.microsoft.com/office/drawing/2014/main" xmlns="" id="{899FE0E8-F04B-4CCB-957C-54F717797004}"/>
+                <a16:creationId xmlns="" xmlns:a16="http://schemas.microsoft.com/office/drawing/2014/main" id="{899FE0E8-F04B-4CCB-957C-54F717797004}"/>
               </a:ext>
             </a:extLst>
           </p:cNvPr>
@@ -1387,7 +1387,7 @@
           <p:cNvPr id="5" name="Espaço Reservado para Data 4">
             <a:extLst>
               <a:ext uri="{FF2B5EF4-FFF2-40B4-BE49-F238E27FC236}">
-                <a16:creationId xmlns:a16="http://schemas.microsoft.com/office/drawing/2014/main" xmlns="" id="{F472BF12-37CB-4D4D-8F5B-C1BDF2B9DE1C}"/>
+                <a16:creationId xmlns="" xmlns:a16="http://schemas.microsoft.com/office/drawing/2014/main" id="{F472BF12-37CB-4D4D-8F5B-C1BDF2B9DE1C}"/>
               </a:ext>
             </a:extLst>
           </p:cNvPr>
@@ -1405,7 +1405,7 @@
           <a:p>
             <a:fld id="{9783B411-DC8B-4A5C-A959-3C440392E8CA}" type="datetimeFigureOut">
               <a:rPr lang="pt-BR" smtClean="0"/>
-              <a:t>07/09/2020</a:t>
+              <a:t>17/09/2020</a:t>
             </a:fld>
             <a:endParaRPr lang="pt-BR"/>
           </a:p>
@@ -1416,7 +1416,7 @@
           <p:cNvPr id="6" name="Espaço Reservado para Rodapé 5">
             <a:extLst>
               <a:ext uri="{FF2B5EF4-FFF2-40B4-BE49-F238E27FC236}">
-                <a16:creationId xmlns:a16="http://schemas.microsoft.com/office/drawing/2014/main" xmlns="" id="{7846E00A-3C85-4BA1-A12D-5D369F944FD1}"/>
+                <a16:creationId xmlns="" xmlns:a16="http://schemas.microsoft.com/office/drawing/2014/main" id="{7846E00A-3C85-4BA1-A12D-5D369F944FD1}"/>
               </a:ext>
             </a:extLst>
           </p:cNvPr>
@@ -1441,7 +1441,7 @@
           <p:cNvPr id="7" name="Espaço Reservado para Número de Slide 6">
             <a:extLst>
               <a:ext uri="{FF2B5EF4-FFF2-40B4-BE49-F238E27FC236}">
-                <a16:creationId xmlns:a16="http://schemas.microsoft.com/office/drawing/2014/main" xmlns="" id="{B0DE8226-9F1D-4F47-A025-054CC52736F7}"/>
+                <a16:creationId xmlns="" xmlns:a16="http://schemas.microsoft.com/office/drawing/2014/main" id="{B0DE8226-9F1D-4F47-A025-054CC52736F7}"/>
               </a:ext>
             </a:extLst>
           </p:cNvPr>
@@ -1500,7 +1500,7 @@
           <p:cNvPr id="2" name="Título 1">
             <a:extLst>
               <a:ext uri="{FF2B5EF4-FFF2-40B4-BE49-F238E27FC236}">
-                <a16:creationId xmlns:a16="http://schemas.microsoft.com/office/drawing/2014/main" xmlns="" id="{4CD216BE-EEEC-4BF4-8D2B-07658A3C248D}"/>
+                <a16:creationId xmlns="" xmlns:a16="http://schemas.microsoft.com/office/drawing/2014/main" id="{4CD216BE-EEEC-4BF4-8D2B-07658A3C248D}"/>
               </a:ext>
             </a:extLst>
           </p:cNvPr>
@@ -1533,7 +1533,7 @@
           <p:cNvPr id="3" name="Espaço Reservado para Texto 2">
             <a:extLst>
               <a:ext uri="{FF2B5EF4-FFF2-40B4-BE49-F238E27FC236}">
-                <a16:creationId xmlns:a16="http://schemas.microsoft.com/office/drawing/2014/main" xmlns="" id="{B96BFFCE-92DC-4F33-8C6C-FD322D3834B5}"/>
+                <a16:creationId xmlns="" xmlns:a16="http://schemas.microsoft.com/office/drawing/2014/main" id="{B96BFFCE-92DC-4F33-8C6C-FD322D3834B5}"/>
               </a:ext>
             </a:extLst>
           </p:cNvPr>
@@ -1604,7 +1604,7 @@
           <p:cNvPr id="4" name="Espaço Reservado para Conteúdo 3">
             <a:extLst>
               <a:ext uri="{FF2B5EF4-FFF2-40B4-BE49-F238E27FC236}">
-                <a16:creationId xmlns:a16="http://schemas.microsoft.com/office/drawing/2014/main" xmlns="" id="{BAFDC0C5-2873-41AA-855F-585AECC5A2ED}"/>
+                <a16:creationId xmlns="" xmlns:a16="http://schemas.microsoft.com/office/drawing/2014/main" id="{BAFDC0C5-2873-41AA-855F-585AECC5A2ED}"/>
               </a:ext>
             </a:extLst>
           </p:cNvPr>
@@ -1666,7 +1666,7 @@
           <p:cNvPr id="5" name="Espaço Reservado para Texto 4">
             <a:extLst>
               <a:ext uri="{FF2B5EF4-FFF2-40B4-BE49-F238E27FC236}">
-                <a16:creationId xmlns:a16="http://schemas.microsoft.com/office/drawing/2014/main" xmlns="" id="{CB3F9DFA-1771-4F6B-8972-C4CD76D273E7}"/>
+                <a16:creationId xmlns="" xmlns:a16="http://schemas.microsoft.com/office/drawing/2014/main" id="{CB3F9DFA-1771-4F6B-8972-C4CD76D273E7}"/>
               </a:ext>
             </a:extLst>
           </p:cNvPr>
@@ -1737,7 +1737,7 @@
           <p:cNvPr id="6" name="Espaço Reservado para Conteúdo 5">
             <a:extLst>
               <a:ext uri="{FF2B5EF4-FFF2-40B4-BE49-F238E27FC236}">
-                <a16:creationId xmlns:a16="http://schemas.microsoft.com/office/drawing/2014/main" xmlns="" id="{635D06A2-AE7A-4501-ADC7-DD9BB409A40D}"/>
+                <a16:creationId xmlns="" xmlns:a16="http://schemas.microsoft.com/office/drawing/2014/main" id="{635D06A2-AE7A-4501-ADC7-DD9BB409A40D}"/>
               </a:ext>
             </a:extLst>
           </p:cNvPr>
@@ -1799,7 +1799,7 @@
           <p:cNvPr id="7" name="Espaço Reservado para Data 6">
             <a:extLst>
               <a:ext uri="{FF2B5EF4-FFF2-40B4-BE49-F238E27FC236}">
-                <a16:creationId xmlns:a16="http://schemas.microsoft.com/office/drawing/2014/main" xmlns="" id="{B75BA298-C1D5-48E2-A1F2-4C13679D5094}"/>
+                <a16:creationId xmlns="" xmlns:a16="http://schemas.microsoft.com/office/drawing/2014/main" id="{B75BA298-C1D5-48E2-A1F2-4C13679D5094}"/>
               </a:ext>
             </a:extLst>
           </p:cNvPr>
@@ -1817,7 +1817,7 @@
           <a:p>
             <a:fld id="{9783B411-DC8B-4A5C-A959-3C440392E8CA}" type="datetimeFigureOut">
               <a:rPr lang="pt-BR" smtClean="0"/>
-              <a:t>07/09/2020</a:t>
+              <a:t>17/09/2020</a:t>
             </a:fld>
             <a:endParaRPr lang="pt-BR"/>
           </a:p>
@@ -1828,7 +1828,7 @@
           <p:cNvPr id="8" name="Espaço Reservado para Rodapé 7">
             <a:extLst>
               <a:ext uri="{FF2B5EF4-FFF2-40B4-BE49-F238E27FC236}">
-                <a16:creationId xmlns:a16="http://schemas.microsoft.com/office/drawing/2014/main" xmlns="" id="{F5A0D037-4E2F-4E32-B48A-60AAAFD0AD45}"/>
+                <a16:creationId xmlns="" xmlns:a16="http://schemas.microsoft.com/office/drawing/2014/main" id="{F5A0D037-4E2F-4E32-B48A-60AAAFD0AD45}"/>
               </a:ext>
             </a:extLst>
           </p:cNvPr>
@@ -1853,7 +1853,7 @@
           <p:cNvPr id="9" name="Espaço Reservado para Número de Slide 8">
             <a:extLst>
               <a:ext uri="{FF2B5EF4-FFF2-40B4-BE49-F238E27FC236}">
-                <a16:creationId xmlns:a16="http://schemas.microsoft.com/office/drawing/2014/main" xmlns="" id="{F33AC024-5F97-4E69-B6DB-2571EE188618}"/>
+                <a16:creationId xmlns="" xmlns:a16="http://schemas.microsoft.com/office/drawing/2014/main" id="{F33AC024-5F97-4E69-B6DB-2571EE188618}"/>
               </a:ext>
             </a:extLst>
           </p:cNvPr>
@@ -1912,7 +1912,7 @@
           <p:cNvPr id="2" name="Título 1">
             <a:extLst>
               <a:ext uri="{FF2B5EF4-FFF2-40B4-BE49-F238E27FC236}">
-                <a16:creationId xmlns:a16="http://schemas.microsoft.com/office/drawing/2014/main" xmlns="" id="{2E968816-2E29-4E8D-9125-310F48152AFF}"/>
+                <a16:creationId xmlns="" xmlns:a16="http://schemas.microsoft.com/office/drawing/2014/main" id="{2E968816-2E29-4E8D-9125-310F48152AFF}"/>
               </a:ext>
             </a:extLst>
           </p:cNvPr>
@@ -1940,7 +1940,7 @@
           <p:cNvPr id="3" name="Espaço Reservado para Data 2">
             <a:extLst>
               <a:ext uri="{FF2B5EF4-FFF2-40B4-BE49-F238E27FC236}">
-                <a16:creationId xmlns:a16="http://schemas.microsoft.com/office/drawing/2014/main" xmlns="" id="{F5557251-6955-49CB-B8CC-992DEF0CE8C1}"/>
+                <a16:creationId xmlns="" xmlns:a16="http://schemas.microsoft.com/office/drawing/2014/main" id="{F5557251-6955-49CB-B8CC-992DEF0CE8C1}"/>
               </a:ext>
             </a:extLst>
           </p:cNvPr>
@@ -1958,7 +1958,7 @@
           <a:p>
             <a:fld id="{9783B411-DC8B-4A5C-A959-3C440392E8CA}" type="datetimeFigureOut">
               <a:rPr lang="pt-BR" smtClean="0"/>
-              <a:t>07/09/2020</a:t>
+              <a:t>17/09/2020</a:t>
             </a:fld>
             <a:endParaRPr lang="pt-BR"/>
           </a:p>
@@ -1969,7 +1969,7 @@
           <p:cNvPr id="4" name="Espaço Reservado para Rodapé 3">
             <a:extLst>
               <a:ext uri="{FF2B5EF4-FFF2-40B4-BE49-F238E27FC236}">
-                <a16:creationId xmlns:a16="http://schemas.microsoft.com/office/drawing/2014/main" xmlns="" id="{47E9D462-D06D-4379-8E3D-92721283AC84}"/>
+                <a16:creationId xmlns="" xmlns:a16="http://schemas.microsoft.com/office/drawing/2014/main" id="{47E9D462-D06D-4379-8E3D-92721283AC84}"/>
               </a:ext>
             </a:extLst>
           </p:cNvPr>
@@ -1994,7 +1994,7 @@
           <p:cNvPr id="5" name="Espaço Reservado para Número de Slide 4">
             <a:extLst>
               <a:ext uri="{FF2B5EF4-FFF2-40B4-BE49-F238E27FC236}">
-                <a16:creationId xmlns:a16="http://schemas.microsoft.com/office/drawing/2014/main" xmlns="" id="{34C9FC44-B1C3-404D-BC57-8EF40077B60B}"/>
+                <a16:creationId xmlns="" xmlns:a16="http://schemas.microsoft.com/office/drawing/2014/main" id="{34C9FC44-B1C3-404D-BC57-8EF40077B60B}"/>
               </a:ext>
             </a:extLst>
           </p:cNvPr>
@@ -2053,7 +2053,7 @@
           <p:cNvPr id="2" name="Espaço Reservado para Data 1">
             <a:extLst>
               <a:ext uri="{FF2B5EF4-FFF2-40B4-BE49-F238E27FC236}">
-                <a16:creationId xmlns:a16="http://schemas.microsoft.com/office/drawing/2014/main" xmlns="" id="{061EAFC6-43F1-4402-8001-0392ABBF534E}"/>
+                <a16:creationId xmlns="" xmlns:a16="http://schemas.microsoft.com/office/drawing/2014/main" id="{061EAFC6-43F1-4402-8001-0392ABBF534E}"/>
               </a:ext>
             </a:extLst>
           </p:cNvPr>
@@ -2071,7 +2071,7 @@
           <a:p>
             <a:fld id="{9783B411-DC8B-4A5C-A959-3C440392E8CA}" type="datetimeFigureOut">
               <a:rPr lang="pt-BR" smtClean="0"/>
-              <a:t>07/09/2020</a:t>
+              <a:t>17/09/2020</a:t>
             </a:fld>
             <a:endParaRPr lang="pt-BR"/>
           </a:p>
@@ -2082,7 +2082,7 @@
           <p:cNvPr id="3" name="Espaço Reservado para Rodapé 2">
             <a:extLst>
               <a:ext uri="{FF2B5EF4-FFF2-40B4-BE49-F238E27FC236}">
-                <a16:creationId xmlns:a16="http://schemas.microsoft.com/office/drawing/2014/main" xmlns="" id="{FBEA1E22-5278-4F8C-967C-93CD7F8D2C56}"/>
+                <a16:creationId xmlns="" xmlns:a16="http://schemas.microsoft.com/office/drawing/2014/main" id="{FBEA1E22-5278-4F8C-967C-93CD7F8D2C56}"/>
               </a:ext>
             </a:extLst>
           </p:cNvPr>
@@ -2107,7 +2107,7 @@
           <p:cNvPr id="4" name="Espaço Reservado para Número de Slide 3">
             <a:extLst>
               <a:ext uri="{FF2B5EF4-FFF2-40B4-BE49-F238E27FC236}">
-                <a16:creationId xmlns:a16="http://schemas.microsoft.com/office/drawing/2014/main" xmlns="" id="{0CA4ED80-0194-491C-8581-CD808686695E}"/>
+                <a16:creationId xmlns="" xmlns:a16="http://schemas.microsoft.com/office/drawing/2014/main" id="{0CA4ED80-0194-491C-8581-CD808686695E}"/>
               </a:ext>
             </a:extLst>
           </p:cNvPr>
@@ -2166,7 +2166,7 @@
           <p:cNvPr id="2" name="Título 1">
             <a:extLst>
               <a:ext uri="{FF2B5EF4-FFF2-40B4-BE49-F238E27FC236}">
-                <a16:creationId xmlns:a16="http://schemas.microsoft.com/office/drawing/2014/main" xmlns="" id="{73C3C132-5FC0-4CBF-95D8-ED7939C46DFC}"/>
+                <a16:creationId xmlns="" xmlns:a16="http://schemas.microsoft.com/office/drawing/2014/main" id="{73C3C132-5FC0-4CBF-95D8-ED7939C46DFC}"/>
               </a:ext>
             </a:extLst>
           </p:cNvPr>
@@ -2203,7 +2203,7 @@
           <p:cNvPr id="3" name="Espaço Reservado para Conteúdo 2">
             <a:extLst>
               <a:ext uri="{FF2B5EF4-FFF2-40B4-BE49-F238E27FC236}">
-                <a16:creationId xmlns:a16="http://schemas.microsoft.com/office/drawing/2014/main" xmlns="" id="{0E1D7B5A-C565-4E37-A964-03C9387736FA}"/>
+                <a16:creationId xmlns="" xmlns:a16="http://schemas.microsoft.com/office/drawing/2014/main" id="{0E1D7B5A-C565-4E37-A964-03C9387736FA}"/>
               </a:ext>
             </a:extLst>
           </p:cNvPr>
@@ -2293,7 +2293,7 @@
           <p:cNvPr id="4" name="Espaço Reservado para Texto 3">
             <a:extLst>
               <a:ext uri="{FF2B5EF4-FFF2-40B4-BE49-F238E27FC236}">
-                <a16:creationId xmlns:a16="http://schemas.microsoft.com/office/drawing/2014/main" xmlns="" id="{32E4DCE7-F6CC-4011-857C-399B18FA6A46}"/>
+                <a16:creationId xmlns="" xmlns:a16="http://schemas.microsoft.com/office/drawing/2014/main" id="{32E4DCE7-F6CC-4011-857C-399B18FA6A46}"/>
               </a:ext>
             </a:extLst>
           </p:cNvPr>
@@ -2364,7 +2364,7 @@
           <p:cNvPr id="5" name="Espaço Reservado para Data 4">
             <a:extLst>
               <a:ext uri="{FF2B5EF4-FFF2-40B4-BE49-F238E27FC236}">
-                <a16:creationId xmlns:a16="http://schemas.microsoft.com/office/drawing/2014/main" xmlns="" id="{AB6E2ECC-DD75-459D-8CDC-268C8A67BFD3}"/>
+                <a16:creationId xmlns="" xmlns:a16="http://schemas.microsoft.com/office/drawing/2014/main" id="{AB6E2ECC-DD75-459D-8CDC-268C8A67BFD3}"/>
               </a:ext>
             </a:extLst>
           </p:cNvPr>
@@ -2382,7 +2382,7 @@
           <a:p>
             <a:fld id="{9783B411-DC8B-4A5C-A959-3C440392E8CA}" type="datetimeFigureOut">
               <a:rPr lang="pt-BR" smtClean="0"/>
-              <a:t>07/09/2020</a:t>
+              <a:t>17/09/2020</a:t>
             </a:fld>
             <a:endParaRPr lang="pt-BR"/>
           </a:p>
@@ -2393,7 +2393,7 @@
           <p:cNvPr id="6" name="Espaço Reservado para Rodapé 5">
             <a:extLst>
               <a:ext uri="{FF2B5EF4-FFF2-40B4-BE49-F238E27FC236}">
-                <a16:creationId xmlns:a16="http://schemas.microsoft.com/office/drawing/2014/main" xmlns="" id="{2A77EE72-B469-4ACA-927F-95B60D6F07FB}"/>
+                <a16:creationId xmlns="" xmlns:a16="http://schemas.microsoft.com/office/drawing/2014/main" id="{2A77EE72-B469-4ACA-927F-95B60D6F07FB}"/>
               </a:ext>
             </a:extLst>
           </p:cNvPr>
@@ -2418,7 +2418,7 @@
           <p:cNvPr id="7" name="Espaço Reservado para Número de Slide 6">
             <a:extLst>
               <a:ext uri="{FF2B5EF4-FFF2-40B4-BE49-F238E27FC236}">
-                <a16:creationId xmlns:a16="http://schemas.microsoft.com/office/drawing/2014/main" xmlns="" id="{10C369D1-5F76-4936-900A-B0E047B114D5}"/>
+                <a16:creationId xmlns="" xmlns:a16="http://schemas.microsoft.com/office/drawing/2014/main" id="{10C369D1-5F76-4936-900A-B0E047B114D5}"/>
               </a:ext>
             </a:extLst>
           </p:cNvPr>
@@ -2477,7 +2477,7 @@
           <p:cNvPr id="2" name="Título 1">
             <a:extLst>
               <a:ext uri="{FF2B5EF4-FFF2-40B4-BE49-F238E27FC236}">
-                <a16:creationId xmlns:a16="http://schemas.microsoft.com/office/drawing/2014/main" xmlns="" id="{CB407E8F-FFCE-43EB-BA23-CDDB6F816FC4}"/>
+                <a16:creationId xmlns="" xmlns:a16="http://schemas.microsoft.com/office/drawing/2014/main" id="{CB407E8F-FFCE-43EB-BA23-CDDB6F816FC4}"/>
               </a:ext>
             </a:extLst>
           </p:cNvPr>
@@ -2514,7 +2514,7 @@
           <p:cNvPr id="3" name="Espaço Reservado para Imagem 2">
             <a:extLst>
               <a:ext uri="{FF2B5EF4-FFF2-40B4-BE49-F238E27FC236}">
-                <a16:creationId xmlns:a16="http://schemas.microsoft.com/office/drawing/2014/main" xmlns="" id="{02F872B6-E694-423B-89E1-51CE6A8AA3C3}"/>
+                <a16:creationId xmlns="" xmlns:a16="http://schemas.microsoft.com/office/drawing/2014/main" id="{02F872B6-E694-423B-89E1-51CE6A8AA3C3}"/>
               </a:ext>
             </a:extLst>
           </p:cNvPr>
@@ -2581,7 +2581,7 @@
           <p:cNvPr id="4" name="Espaço Reservado para Texto 3">
             <a:extLst>
               <a:ext uri="{FF2B5EF4-FFF2-40B4-BE49-F238E27FC236}">
-                <a16:creationId xmlns:a16="http://schemas.microsoft.com/office/drawing/2014/main" xmlns="" id="{103C9B80-E958-4ADB-91B3-264F82EB74BC}"/>
+                <a16:creationId xmlns="" xmlns:a16="http://schemas.microsoft.com/office/drawing/2014/main" id="{103C9B80-E958-4ADB-91B3-264F82EB74BC}"/>
               </a:ext>
             </a:extLst>
           </p:cNvPr>
@@ -2652,7 +2652,7 @@
           <p:cNvPr id="5" name="Espaço Reservado para Data 4">
             <a:extLst>
               <a:ext uri="{FF2B5EF4-FFF2-40B4-BE49-F238E27FC236}">
-                <a16:creationId xmlns:a16="http://schemas.microsoft.com/office/drawing/2014/main" xmlns="" id="{9F763377-9A5A-4526-960B-E52B4667DF8B}"/>
+                <a16:creationId xmlns="" xmlns:a16="http://schemas.microsoft.com/office/drawing/2014/main" id="{9F763377-9A5A-4526-960B-E52B4667DF8B}"/>
               </a:ext>
             </a:extLst>
           </p:cNvPr>
@@ -2670,7 +2670,7 @@
           <a:p>
             <a:fld id="{9783B411-DC8B-4A5C-A959-3C440392E8CA}" type="datetimeFigureOut">
               <a:rPr lang="pt-BR" smtClean="0"/>
-              <a:t>07/09/2020</a:t>
+              <a:t>17/09/2020</a:t>
             </a:fld>
             <a:endParaRPr lang="pt-BR"/>
           </a:p>
@@ -2681,7 +2681,7 @@
           <p:cNvPr id="6" name="Espaço Reservado para Rodapé 5">
             <a:extLst>
               <a:ext uri="{FF2B5EF4-FFF2-40B4-BE49-F238E27FC236}">
-                <a16:creationId xmlns:a16="http://schemas.microsoft.com/office/drawing/2014/main" xmlns="" id="{AB7472D6-5BC4-4E6E-B6A0-D154F9286DEE}"/>
+                <a16:creationId xmlns="" xmlns:a16="http://schemas.microsoft.com/office/drawing/2014/main" id="{AB7472D6-5BC4-4E6E-B6A0-D154F9286DEE}"/>
               </a:ext>
             </a:extLst>
           </p:cNvPr>
@@ -2706,7 +2706,7 @@
           <p:cNvPr id="7" name="Espaço Reservado para Número de Slide 6">
             <a:extLst>
               <a:ext uri="{FF2B5EF4-FFF2-40B4-BE49-F238E27FC236}">
-                <a16:creationId xmlns:a16="http://schemas.microsoft.com/office/drawing/2014/main" xmlns="" id="{26CAD0A5-B35A-4EB9-BB87-1B9055E6CB6E}"/>
+                <a16:creationId xmlns="" xmlns:a16="http://schemas.microsoft.com/office/drawing/2014/main" id="{26CAD0A5-B35A-4EB9-BB87-1B9055E6CB6E}"/>
               </a:ext>
             </a:extLst>
           </p:cNvPr>
@@ -2770,7 +2770,7 @@
           <p:cNvPr id="2" name="Espaço Reservado para Título 1">
             <a:extLst>
               <a:ext uri="{FF2B5EF4-FFF2-40B4-BE49-F238E27FC236}">
-                <a16:creationId xmlns:a16="http://schemas.microsoft.com/office/drawing/2014/main" xmlns="" id="{EF864443-E9BD-49C0-81F8-1B42D792B09E}"/>
+                <a16:creationId xmlns="" xmlns:a16="http://schemas.microsoft.com/office/drawing/2014/main" id="{EF864443-E9BD-49C0-81F8-1B42D792B09E}"/>
               </a:ext>
             </a:extLst>
           </p:cNvPr>
@@ -2808,7 +2808,7 @@
           <p:cNvPr id="3" name="Espaço Reservado para Texto 2">
             <a:extLst>
               <a:ext uri="{FF2B5EF4-FFF2-40B4-BE49-F238E27FC236}">
-                <a16:creationId xmlns:a16="http://schemas.microsoft.com/office/drawing/2014/main" xmlns="" id="{475853B4-421C-4F4A-A808-94AB185E42DD}"/>
+                <a16:creationId xmlns="" xmlns:a16="http://schemas.microsoft.com/office/drawing/2014/main" id="{475853B4-421C-4F4A-A808-94AB185E42DD}"/>
               </a:ext>
             </a:extLst>
           </p:cNvPr>
@@ -2875,7 +2875,7 @@
           <p:cNvPr id="4" name="Espaço Reservado para Data 3">
             <a:extLst>
               <a:ext uri="{FF2B5EF4-FFF2-40B4-BE49-F238E27FC236}">
-                <a16:creationId xmlns:a16="http://schemas.microsoft.com/office/drawing/2014/main" xmlns="" id="{5B5B2D8E-1F67-4806-B4B5-54B77F3F0102}"/>
+                <a16:creationId xmlns="" xmlns:a16="http://schemas.microsoft.com/office/drawing/2014/main" id="{5B5B2D8E-1F67-4806-B4B5-54B77F3F0102}"/>
               </a:ext>
             </a:extLst>
           </p:cNvPr>
@@ -2911,7 +2911,7 @@
           <a:p>
             <a:fld id="{9783B411-DC8B-4A5C-A959-3C440392E8CA}" type="datetimeFigureOut">
               <a:rPr lang="pt-BR" smtClean="0"/>
-              <a:t>07/09/2020</a:t>
+              <a:t>17/09/2020</a:t>
             </a:fld>
             <a:endParaRPr lang="pt-BR"/>
           </a:p>
@@ -2922,7 +2922,7 @@
           <p:cNvPr id="5" name="Espaço Reservado para Rodapé 4">
             <a:extLst>
               <a:ext uri="{FF2B5EF4-FFF2-40B4-BE49-F238E27FC236}">
-                <a16:creationId xmlns:a16="http://schemas.microsoft.com/office/drawing/2014/main" xmlns="" id="{B360D84C-367A-453E-9F2D-4B48732701FE}"/>
+                <a16:creationId xmlns="" xmlns:a16="http://schemas.microsoft.com/office/drawing/2014/main" id="{B360D84C-367A-453E-9F2D-4B48732701FE}"/>
               </a:ext>
             </a:extLst>
           </p:cNvPr>
@@ -2965,7 +2965,7 @@
           <p:cNvPr id="6" name="Espaço Reservado para Número de Slide 5">
             <a:extLst>
               <a:ext uri="{FF2B5EF4-FFF2-40B4-BE49-F238E27FC236}">
-                <a16:creationId xmlns:a16="http://schemas.microsoft.com/office/drawing/2014/main" xmlns="" id="{2813E955-A96A-4888-A14E-AF99FFCAAB09}"/>
+                <a16:creationId xmlns="" xmlns:a16="http://schemas.microsoft.com/office/drawing/2014/main" id="{2813E955-A96A-4888-A14E-AF99FFCAAB09}"/>
               </a:ext>
             </a:extLst>
           </p:cNvPr>
@@ -3333,7 +3333,7 @@
           <p:cNvPr id="1026" name="Picture 2" descr="BandTec Digital School | Digital School">
             <a:extLst>
               <a:ext uri="{FF2B5EF4-FFF2-40B4-BE49-F238E27FC236}">
-                <a16:creationId xmlns:a16="http://schemas.microsoft.com/office/drawing/2014/main" xmlns="" id="{24D5F5D3-9169-459C-A403-B086489DD0BC}"/>
+                <a16:creationId xmlns="" xmlns:a16="http://schemas.microsoft.com/office/drawing/2014/main" id="{24D5F5D3-9169-459C-A403-B086489DD0BC}"/>
               </a:ext>
             </a:extLst>
           </p:cNvPr>
@@ -3380,7 +3380,7 @@
           <p:cNvPr id="4" name="CaixaDeTexto 3">
             <a:extLst>
               <a:ext uri="{FF2B5EF4-FFF2-40B4-BE49-F238E27FC236}">
-                <a16:creationId xmlns:a16="http://schemas.microsoft.com/office/drawing/2014/main" xmlns="" id="{E0909E9E-AAC5-41C7-9A78-C7B8003BD98A}"/>
+                <a16:creationId xmlns="" xmlns:a16="http://schemas.microsoft.com/office/drawing/2014/main" id="{E0909E9E-AAC5-41C7-9A78-C7B8003BD98A}"/>
               </a:ext>
             </a:extLst>
           </p:cNvPr>
@@ -3469,7 +3469,7 @@
           <p:cNvPr id="5" name="CaixaDeTexto 4">
             <a:extLst>
               <a:ext uri="{FF2B5EF4-FFF2-40B4-BE49-F238E27FC236}">
-                <a16:creationId xmlns:a16="http://schemas.microsoft.com/office/drawing/2014/main" xmlns="" id="{0712C8B2-E540-48F1-B533-7DFD87840868}"/>
+                <a16:creationId xmlns="" xmlns:a16="http://schemas.microsoft.com/office/drawing/2014/main" id="{0712C8B2-E540-48F1-B533-7DFD87840868}"/>
               </a:ext>
             </a:extLst>
           </p:cNvPr>
@@ -3555,7 +3555,7 @@
           <p:cNvPr id="7" name="Picture 2" descr="BandTec Digital School | Digital School">
             <a:extLst>
               <a:ext uri="{FF2B5EF4-FFF2-40B4-BE49-F238E27FC236}">
-                <a16:creationId xmlns:a16="http://schemas.microsoft.com/office/drawing/2014/main" xmlns="" id="{3CC8B883-DEC6-4417-8C7E-D2CE213A148C}"/>
+                <a16:creationId xmlns="" xmlns:a16="http://schemas.microsoft.com/office/drawing/2014/main" id="{3CC8B883-DEC6-4417-8C7E-D2CE213A148C}"/>
               </a:ext>
             </a:extLst>
           </p:cNvPr>
@@ -3602,7 +3602,7 @@
           <p:cNvPr id="9" name="CaixaDeTexto 8">
             <a:extLst>
               <a:ext uri="{FF2B5EF4-FFF2-40B4-BE49-F238E27FC236}">
-                <a16:creationId xmlns:a16="http://schemas.microsoft.com/office/drawing/2014/main" xmlns="" id="{9E4B10E0-1717-4593-9215-B2D4D86BFE88}"/>
+                <a16:creationId xmlns="" xmlns:a16="http://schemas.microsoft.com/office/drawing/2014/main" id="{9E4B10E0-1717-4593-9215-B2D4D86BFE88}"/>
               </a:ext>
             </a:extLst>
           </p:cNvPr>
@@ -3655,7 +3655,7 @@
           <p:cNvPr id="11" name="Retângulo 10">
             <a:extLst>
               <a:ext uri="{FF2B5EF4-FFF2-40B4-BE49-F238E27FC236}">
-                <a16:creationId xmlns:a16="http://schemas.microsoft.com/office/drawing/2014/main" xmlns="" id="{E5D9890D-8D7F-41A7-BB95-BDCACE508432}"/>
+                <a16:creationId xmlns="" xmlns:a16="http://schemas.microsoft.com/office/drawing/2014/main" id="{E5D9890D-8D7F-41A7-BB95-BDCACE508432}"/>
               </a:ext>
             </a:extLst>
           </p:cNvPr>
@@ -3707,7 +3707,7 @@
           <p:cNvPr id="13" name="Retângulo 12">
             <a:extLst>
               <a:ext uri="{FF2B5EF4-FFF2-40B4-BE49-F238E27FC236}">
-                <a16:creationId xmlns:a16="http://schemas.microsoft.com/office/drawing/2014/main" xmlns="" id="{6DFA49B4-2EF7-4215-9A29-EA396C224E52}"/>
+                <a16:creationId xmlns="" xmlns:a16="http://schemas.microsoft.com/office/drawing/2014/main" id="{6DFA49B4-2EF7-4215-9A29-EA396C224E52}"/>
               </a:ext>
             </a:extLst>
           </p:cNvPr>
@@ -3759,7 +3759,7 @@
           <p:cNvPr id="15" name="Retângulo 14">
             <a:extLst>
               <a:ext uri="{FF2B5EF4-FFF2-40B4-BE49-F238E27FC236}">
-                <a16:creationId xmlns:a16="http://schemas.microsoft.com/office/drawing/2014/main" xmlns="" id="{2E54422A-F249-4808-A913-593244F3CFB7}"/>
+                <a16:creationId xmlns="" xmlns:a16="http://schemas.microsoft.com/office/drawing/2014/main" id="{2E54422A-F249-4808-A913-593244F3CFB7}"/>
               </a:ext>
             </a:extLst>
           </p:cNvPr>
@@ -3811,7 +3811,7 @@
           <p:cNvPr id="17" name="CaixaDeTexto 16">
             <a:extLst>
               <a:ext uri="{FF2B5EF4-FFF2-40B4-BE49-F238E27FC236}">
-                <a16:creationId xmlns:a16="http://schemas.microsoft.com/office/drawing/2014/main" xmlns="" id="{650F403E-88A1-461B-B11C-90A87684B0C5}"/>
+                <a16:creationId xmlns="" xmlns:a16="http://schemas.microsoft.com/office/drawing/2014/main" id="{650F403E-88A1-461B-B11C-90A87684B0C5}"/>
               </a:ext>
             </a:extLst>
           </p:cNvPr>
@@ -3851,7 +3851,7 @@
           <p:cNvPr id="19" name="CaixaDeTexto 18">
             <a:extLst>
               <a:ext uri="{FF2B5EF4-FFF2-40B4-BE49-F238E27FC236}">
-                <a16:creationId xmlns:a16="http://schemas.microsoft.com/office/drawing/2014/main" xmlns="" id="{E8C61490-0160-4D7A-9D20-11720E42E4C4}"/>
+                <a16:creationId xmlns="" xmlns:a16="http://schemas.microsoft.com/office/drawing/2014/main" id="{E8C61490-0160-4D7A-9D20-11720E42E4C4}"/>
               </a:ext>
             </a:extLst>
           </p:cNvPr>
@@ -3891,7 +3891,7 @@
           <p:cNvPr id="21" name="CaixaDeTexto 20">
             <a:extLst>
               <a:ext uri="{FF2B5EF4-FFF2-40B4-BE49-F238E27FC236}">
-                <a16:creationId xmlns:a16="http://schemas.microsoft.com/office/drawing/2014/main" xmlns="" id="{BFA47613-7892-4AAC-B20C-691C8665CD05}"/>
+                <a16:creationId xmlns="" xmlns:a16="http://schemas.microsoft.com/office/drawing/2014/main" id="{BFA47613-7892-4AAC-B20C-691C8665CD05}"/>
               </a:ext>
             </a:extLst>
           </p:cNvPr>
@@ -3931,7 +3931,7 @@
           <p:cNvPr id="22" name="CaixaDeTexto 21">
             <a:extLst>
               <a:ext uri="{FF2B5EF4-FFF2-40B4-BE49-F238E27FC236}">
-                <a16:creationId xmlns:a16="http://schemas.microsoft.com/office/drawing/2014/main" xmlns="" id="{E071DEA6-0A18-46B0-84E2-49884005001D}"/>
+                <a16:creationId xmlns="" xmlns:a16="http://schemas.microsoft.com/office/drawing/2014/main" id="{E071DEA6-0A18-46B0-84E2-49884005001D}"/>
               </a:ext>
             </a:extLst>
           </p:cNvPr>
@@ -4097,59 +4097,12 @@
           </a:p>
         </p:txBody>
       </p:sp>
-      <p:pic>
-        <p:nvPicPr>
-          <p:cNvPr id="1026" name="Picture 2" descr="Man Sitting Alone In Restaurant With Laptop Stock Image - Image of  lifestyle, eating: 38300407">
-            <a:extLst>
-              <a:ext uri="{FF2B5EF4-FFF2-40B4-BE49-F238E27FC236}">
-                <a16:creationId xmlns:a16="http://schemas.microsoft.com/office/drawing/2014/main" xmlns="" id="{1D901612-963C-462B-85A4-7E091F20018E}"/>
-              </a:ext>
-            </a:extLst>
-          </p:cNvPr>
-          <p:cNvPicPr>
-            <a:picLocks noChangeAspect="1" noChangeArrowheads="1"/>
-          </p:cNvPicPr>
-          <p:nvPr/>
-        </p:nvPicPr>
-        <p:blipFill>
-          <a:blip r:embed="rId3" cstate="print">
-            <a:extLst>
-              <a:ext uri="{28A0092B-C50C-407E-A947-70E740481C1C}">
-                <a14:useLocalDpi xmlns:a14="http://schemas.microsoft.com/office/drawing/2010/main" val="0"/>
-              </a:ext>
-            </a:extLst>
-          </a:blip>
-          <a:srcRect/>
-          <a:stretch>
-            <a:fillRect/>
-          </a:stretch>
-        </p:blipFill>
-        <p:spPr bwMode="auto">
-          <a:xfrm>
-            <a:off x="1895498" y="2100332"/>
-            <a:ext cx="2790136" cy="1858928"/>
-          </a:xfrm>
-          <a:prstGeom prst="rect">
-            <a:avLst/>
-          </a:prstGeom>
-          <a:noFill/>
-          <a:extLst>
-            <a:ext uri="{909E8E84-426E-40DD-AFC4-6F175D3DCCD1}">
-              <a14:hiddenFill xmlns:a14="http://schemas.microsoft.com/office/drawing/2010/main">
-                <a:solidFill>
-                  <a:srgbClr val="FFFFFF"/>
-                </a:solidFill>
-              </a14:hiddenFill>
-            </a:ext>
-          </a:extLst>
-        </p:spPr>
-      </p:pic>
       <p:sp>
         <p:nvSpPr>
           <p:cNvPr id="25" name="CaixaDeTexto 24">
             <a:extLst>
               <a:ext uri="{FF2B5EF4-FFF2-40B4-BE49-F238E27FC236}">
-                <a16:creationId xmlns:a16="http://schemas.microsoft.com/office/drawing/2014/main" xmlns="" id="{5B4D3E64-55B4-4DC8-BF78-9303EE7D225E}"/>
+                <a16:creationId xmlns="" xmlns:a16="http://schemas.microsoft.com/office/drawing/2014/main" id="{5B4D3E64-55B4-4DC8-BF78-9303EE7D225E}"/>
               </a:ext>
             </a:extLst>
           </p:cNvPr>
@@ -4190,7 +4143,7 @@
           <p:cNvPr id="24" name="CaixaDeTexto 23">
             <a:extLst>
               <a:ext uri="{FF2B5EF4-FFF2-40B4-BE49-F238E27FC236}">
-                <a16:creationId xmlns:a16="http://schemas.microsoft.com/office/drawing/2014/main" xmlns="" id="{189D2E31-8795-48AA-B159-9D446B25DFCA}"/>
+                <a16:creationId xmlns="" xmlns:a16="http://schemas.microsoft.com/office/drawing/2014/main" id="{189D2E31-8795-48AA-B159-9D446B25DFCA}"/>
               </a:ext>
             </a:extLst>
           </p:cNvPr>
@@ -4274,6 +4227,36 @@
           </a:p>
         </p:txBody>
       </p:sp>
+      <p:pic>
+        <p:nvPicPr>
+          <p:cNvPr id="2" name="Imagem 1"/>
+          <p:cNvPicPr>
+            <a:picLocks noChangeAspect="1"/>
+          </p:cNvPicPr>
+          <p:nvPr/>
+        </p:nvPicPr>
+        <p:blipFill>
+          <a:blip r:embed="rId3">
+            <a:extLst>
+              <a:ext uri="{28A0092B-C50C-407E-A947-70E740481C1C}">
+                <a14:useLocalDpi xmlns:a14="http://schemas.microsoft.com/office/drawing/2010/main" val="0"/>
+              </a:ext>
+            </a:extLst>
+          </a:blip>
+          <a:stretch>
+            <a:fillRect/>
+          </a:stretch>
+        </p:blipFill>
+        <p:spPr>
+          <a:xfrm>
+            <a:off x="2297378" y="1612432"/>
+            <a:ext cx="2993736" cy="2242911"/>
+          </a:xfrm>
+          <a:prstGeom prst="rect">
+            <a:avLst/>
+          </a:prstGeom>
+        </p:spPr>
+      </p:pic>
     </p:spTree>
     <p:extLst>
       <p:ext uri="{BB962C8B-B14F-4D97-AF65-F5344CB8AC3E}">
@@ -4309,7 +4292,7 @@
           <p:cNvPr id="7" name="Picture 2" descr="BandTec Digital School | Digital School">
             <a:extLst>
               <a:ext uri="{FF2B5EF4-FFF2-40B4-BE49-F238E27FC236}">
-                <a16:creationId xmlns:a16="http://schemas.microsoft.com/office/drawing/2014/main" xmlns="" id="{3CC8B883-DEC6-4417-8C7E-D2CE213A148C}"/>
+                <a16:creationId xmlns="" xmlns:a16="http://schemas.microsoft.com/office/drawing/2014/main" id="{3CC8B883-DEC6-4417-8C7E-D2CE213A148C}"/>
               </a:ext>
             </a:extLst>
           </p:cNvPr>
@@ -4356,7 +4339,7 @@
           <p:cNvPr id="9" name="CaixaDeTexto 8">
             <a:extLst>
               <a:ext uri="{FF2B5EF4-FFF2-40B4-BE49-F238E27FC236}">
-                <a16:creationId xmlns:a16="http://schemas.microsoft.com/office/drawing/2014/main" xmlns="" id="{9E4B10E0-1717-4593-9215-B2D4D86BFE88}"/>
+                <a16:creationId xmlns="" xmlns:a16="http://schemas.microsoft.com/office/drawing/2014/main" id="{9E4B10E0-1717-4593-9215-B2D4D86BFE88}"/>
               </a:ext>
             </a:extLst>
           </p:cNvPr>
@@ -4409,7 +4392,7 @@
           <p:cNvPr id="11" name="Retângulo 10">
             <a:extLst>
               <a:ext uri="{FF2B5EF4-FFF2-40B4-BE49-F238E27FC236}">
-                <a16:creationId xmlns:a16="http://schemas.microsoft.com/office/drawing/2014/main" xmlns="" id="{E5D9890D-8D7F-41A7-BB95-BDCACE508432}"/>
+                <a16:creationId xmlns="" xmlns:a16="http://schemas.microsoft.com/office/drawing/2014/main" id="{E5D9890D-8D7F-41A7-BB95-BDCACE508432}"/>
               </a:ext>
             </a:extLst>
           </p:cNvPr>
@@ -4461,7 +4444,7 @@
           <p:cNvPr id="13" name="Retângulo 12">
             <a:extLst>
               <a:ext uri="{FF2B5EF4-FFF2-40B4-BE49-F238E27FC236}">
-                <a16:creationId xmlns:a16="http://schemas.microsoft.com/office/drawing/2014/main" xmlns="" id="{6DFA49B4-2EF7-4215-9A29-EA396C224E52}"/>
+                <a16:creationId xmlns="" xmlns:a16="http://schemas.microsoft.com/office/drawing/2014/main" id="{6DFA49B4-2EF7-4215-9A29-EA396C224E52}"/>
               </a:ext>
             </a:extLst>
           </p:cNvPr>
@@ -4513,7 +4496,7 @@
           <p:cNvPr id="15" name="Retângulo 14">
             <a:extLst>
               <a:ext uri="{FF2B5EF4-FFF2-40B4-BE49-F238E27FC236}">
-                <a16:creationId xmlns:a16="http://schemas.microsoft.com/office/drawing/2014/main" xmlns="" id="{2E54422A-F249-4808-A913-593244F3CFB7}"/>
+                <a16:creationId xmlns="" xmlns:a16="http://schemas.microsoft.com/office/drawing/2014/main" id="{2E54422A-F249-4808-A913-593244F3CFB7}"/>
               </a:ext>
             </a:extLst>
           </p:cNvPr>
@@ -4565,7 +4548,7 @@
           <p:cNvPr id="17" name="CaixaDeTexto 16">
             <a:extLst>
               <a:ext uri="{FF2B5EF4-FFF2-40B4-BE49-F238E27FC236}">
-                <a16:creationId xmlns:a16="http://schemas.microsoft.com/office/drawing/2014/main" xmlns="" id="{650F403E-88A1-461B-B11C-90A87684B0C5}"/>
+                <a16:creationId xmlns="" xmlns:a16="http://schemas.microsoft.com/office/drawing/2014/main" id="{650F403E-88A1-461B-B11C-90A87684B0C5}"/>
               </a:ext>
             </a:extLst>
           </p:cNvPr>
@@ -4605,7 +4588,7 @@
           <p:cNvPr id="19" name="CaixaDeTexto 18">
             <a:extLst>
               <a:ext uri="{FF2B5EF4-FFF2-40B4-BE49-F238E27FC236}">
-                <a16:creationId xmlns:a16="http://schemas.microsoft.com/office/drawing/2014/main" xmlns="" id="{E8C61490-0160-4D7A-9D20-11720E42E4C4}"/>
+                <a16:creationId xmlns="" xmlns:a16="http://schemas.microsoft.com/office/drawing/2014/main" id="{E8C61490-0160-4D7A-9D20-11720E42E4C4}"/>
               </a:ext>
             </a:extLst>
           </p:cNvPr>
@@ -4645,7 +4628,7 @@
           <p:cNvPr id="21" name="CaixaDeTexto 20">
             <a:extLst>
               <a:ext uri="{FF2B5EF4-FFF2-40B4-BE49-F238E27FC236}">
-                <a16:creationId xmlns:a16="http://schemas.microsoft.com/office/drawing/2014/main" xmlns="" id="{BFA47613-7892-4AAC-B20C-691C8665CD05}"/>
+                <a16:creationId xmlns="" xmlns:a16="http://schemas.microsoft.com/office/drawing/2014/main" id="{BFA47613-7892-4AAC-B20C-691C8665CD05}"/>
               </a:ext>
             </a:extLst>
           </p:cNvPr>
@@ -4685,7 +4668,7 @@
           <p:cNvPr id="22" name="CaixaDeTexto 21">
             <a:extLst>
               <a:ext uri="{FF2B5EF4-FFF2-40B4-BE49-F238E27FC236}">
-                <a16:creationId xmlns:a16="http://schemas.microsoft.com/office/drawing/2014/main" xmlns="" id="{E071DEA6-0A18-46B0-84E2-49884005001D}"/>
+                <a16:creationId xmlns="" xmlns:a16="http://schemas.microsoft.com/office/drawing/2014/main" id="{E071DEA6-0A18-46B0-84E2-49884005001D}"/>
               </a:ext>
             </a:extLst>
           </p:cNvPr>
@@ -4847,7 +4830,7 @@
           <p:cNvPr id="25" name="CaixaDeTexto 24">
             <a:extLst>
               <a:ext uri="{FF2B5EF4-FFF2-40B4-BE49-F238E27FC236}">
-                <a16:creationId xmlns:a16="http://schemas.microsoft.com/office/drawing/2014/main" xmlns="" id="{5B4D3E64-55B4-4DC8-BF78-9303EE7D225E}"/>
+                <a16:creationId xmlns="" xmlns:a16="http://schemas.microsoft.com/office/drawing/2014/main" id="{5B4D3E64-55B4-4DC8-BF78-9303EE7D225E}"/>
               </a:ext>
             </a:extLst>
           </p:cNvPr>
@@ -4888,7 +4871,7 @@
           <p:cNvPr id="2050" name="Picture 2" descr="Sujeito, homem enfrentado, brutal, teia, developer., social, mídia,  marketing, expert., homem laptop, trabalhos, como, smm, perito, colaborador  correia fotorreceptora, ou, programmer., remoto, job., freelance, job.,  aquilo, developer., modernos ...">
             <a:extLst>
               <a:ext uri="{FF2B5EF4-FFF2-40B4-BE49-F238E27FC236}">
-                <a16:creationId xmlns:a16="http://schemas.microsoft.com/office/drawing/2014/main" xmlns="" id="{0FD3E6E5-07A4-40F7-8AA2-B08CFD156D1A}"/>
+                <a16:creationId xmlns="" xmlns:a16="http://schemas.microsoft.com/office/drawing/2014/main" id="{0FD3E6E5-07A4-40F7-8AA2-B08CFD156D1A}"/>
               </a:ext>
             </a:extLst>
           </p:cNvPr>
@@ -4933,7 +4916,7 @@
           <p:cNvPr id="2" name="CaixaDeTexto 1">
             <a:extLst>
               <a:ext uri="{FF2B5EF4-FFF2-40B4-BE49-F238E27FC236}">
-                <a16:creationId xmlns:a16="http://schemas.microsoft.com/office/drawing/2014/main" xmlns="" id="{BE2A5784-F7B5-4579-B2D8-0F66F4EB3E93}"/>
+                <a16:creationId xmlns="" xmlns:a16="http://schemas.microsoft.com/office/drawing/2014/main" id="{BE2A5784-F7B5-4579-B2D8-0F66F4EB3E93}"/>
               </a:ext>
             </a:extLst>
           </p:cNvPr>

</xml_diff>